<commit_message>
Work on day 2
</commit_message>
<xml_diff>
--- a/dia2/lab2_JAGS.pptx
+++ b/dia2/lab2_JAGS.pptx
@@ -233,7 +233,7 @@
           <a:p>
             <a:fld id="{9EC8F33C-A7AA-43A7-BCA9-F081EA0B4664}" type="datetimeFigureOut">
               <a:rPr lang="en-US" smtClean="0"/>
-              <a:t>1/9/2019</a:t>
+              <a:t>1/13/2019</a:t>
             </a:fld>
             <a:endParaRPr lang="en-US"/>
           </a:p>
@@ -582,7 +582,7 @@
           </a:ln>
           <a:extLst>
             <a:ext uri="{909E8E84-426E-40dd-AFC4-6F175D3DCCD1}">
-              <a14:hiddenFill xmlns:a14="http://schemas.microsoft.com/office/drawing/2010/main" xmlns="">
+              <a14:hiddenFill xmlns="" xmlns:a14="http://schemas.microsoft.com/office/drawing/2010/main">
                 <a:solidFill>
                   <a:srgbClr val="FFFFFF"/>
                 </a:solidFill>
@@ -625,7 +625,7 @@
           </a:ln>
           <a:extLst>
             <a:ext uri="{909E8E84-426E-40dd-AFC4-6F175D3DCCD1}">
-              <a14:hiddenFill xmlns:a14="http://schemas.microsoft.com/office/drawing/2010/main" xmlns="">
+              <a14:hiddenFill xmlns="" xmlns:a14="http://schemas.microsoft.com/office/drawing/2010/main">
                 <a:noFill/>
               </a14:hiddenFill>
             </a:ext>
@@ -724,7 +724,7 @@
           <a:p>
             <a:fld id="{9A356AEA-056F-417E-9B38-4BA8743FE6C4}" type="datetime1">
               <a:rPr lang="en-US" smtClean="0"/>
-              <a:t>1/9/2019</a:t>
+              <a:t>1/13/2019</a:t>
             </a:fld>
             <a:endParaRPr lang="en-US"/>
           </a:p>
@@ -911,7 +911,7 @@
           <a:p>
             <a:fld id="{09867F7C-1948-4907-9EBC-DD38682B5188}" type="datetime1">
               <a:rPr lang="en-US" smtClean="0"/>
-              <a:t>1/9/2019</a:t>
+              <a:t>1/13/2019</a:t>
             </a:fld>
             <a:endParaRPr lang="en-US"/>
           </a:p>
@@ -1107,7 +1107,7 @@
           <a:p>
             <a:fld id="{A5996870-3492-4879-A20C-50CF7F25E309}" type="datetime1">
               <a:rPr lang="en-US" smtClean="0"/>
-              <a:t>1/9/2019</a:t>
+              <a:t>1/13/2019</a:t>
             </a:fld>
             <a:endParaRPr lang="en-US"/>
           </a:p>
@@ -1359,7 +1359,7 @@
           <a:p>
             <a:fld id="{3339509F-2835-4D20-8448-C5CCD453FC4A}" type="datetime1">
               <a:rPr lang="en-US" smtClean="0"/>
-              <a:t>1/9/2019</a:t>
+              <a:t>1/13/2019</a:t>
             </a:fld>
             <a:endParaRPr lang="en-US"/>
           </a:p>
@@ -1583,7 +1583,7 @@
           <a:p>
             <a:fld id="{7A6EDDDE-DBE4-4114-B865-EC3A2920782E}" type="datetime1">
               <a:rPr lang="en-US" smtClean="0"/>
-              <a:t>1/9/2019</a:t>
+              <a:t>1/13/2019</a:t>
             </a:fld>
             <a:endParaRPr lang="en-US"/>
           </a:p>
@@ -1891,7 +1891,7 @@
           <a:p>
             <a:fld id="{8DA96907-43AE-4B1E-B5FF-6853ADDA5697}" type="datetime1">
               <a:rPr lang="en-US" smtClean="0"/>
-              <a:t>1/9/2019</a:t>
+              <a:t>1/13/2019</a:t>
             </a:fld>
             <a:endParaRPr lang="en-US"/>
           </a:p>
@@ -2059,7 +2059,7 @@
           <a:p>
             <a:fld id="{2E65DF97-DE0F-4515-8F8D-0E1C627BC4E9}" type="datetime1">
               <a:rPr lang="en-US" smtClean="0"/>
-              <a:t>1/9/2019</a:t>
+              <a:t>1/13/2019</a:t>
             </a:fld>
             <a:endParaRPr lang="en-US"/>
           </a:p>
@@ -2371,7 +2371,7 @@
           <a:p>
             <a:fld id="{23B9FD00-80D5-4EA7-B536-8F4F2C3959C9}" type="datetime1">
               <a:rPr lang="en-US" smtClean="0"/>
-              <a:t>1/9/2019</a:t>
+              <a:t>1/13/2019</a:t>
             </a:fld>
             <a:endParaRPr lang="en-US"/>
           </a:p>
@@ -2683,7 +2683,7 @@
           <a:p>
             <a:fld id="{DAC77084-4DB4-4A23-9870-BF49183ACB4C}" type="datetime1">
               <a:rPr lang="en-US" smtClean="0"/>
-              <a:t>1/9/2019</a:t>
+              <a:t>1/13/2019</a:t>
             </a:fld>
             <a:endParaRPr lang="en-US"/>
           </a:p>
@@ -2869,7 +2869,7 @@
           <a:p>
             <a:fld id="{6E487ECE-0D8C-4AFB-BD35-997F06E0971C}" type="datetime1">
               <a:rPr lang="en-US" smtClean="0"/>
-              <a:t>1/9/2019</a:t>
+              <a:t>1/13/2019</a:t>
             </a:fld>
             <a:endParaRPr lang="en-US"/>
           </a:p>
@@ -3078,7 +3078,7 @@
           <a:p>
             <a:fld id="{D4F6DC8D-78A1-49CC-B033-F77D87B04958}" type="datetime1">
               <a:rPr lang="en-US" smtClean="0"/>
-              <a:t>1/9/2019</a:t>
+              <a:t>1/13/2019</a:t>
             </a:fld>
             <a:endParaRPr lang="en-US"/>
           </a:p>
@@ -3381,7 +3381,7 @@
           <a:p>
             <a:fld id="{3BCF4A7C-A413-48DA-9211-5240CAEE1DD4}" type="datetime1">
               <a:rPr lang="en-US" smtClean="0"/>
-              <a:t>1/9/2019</a:t>
+              <a:t>1/13/2019</a:t>
             </a:fld>
             <a:endParaRPr lang="en-US"/>
           </a:p>
@@ -3823,7 +3823,7 @@
           <a:p>
             <a:fld id="{AAE887C4-8D00-4515-BD6B-6D6B646F02F7}" type="datetime1">
               <a:rPr lang="en-US" smtClean="0"/>
-              <a:t>1/9/2019</a:t>
+              <a:t>1/13/2019</a:t>
             </a:fld>
             <a:endParaRPr lang="en-US"/>
           </a:p>
@@ -3958,7 +3958,7 @@
           <a:p>
             <a:fld id="{10C13C5A-776A-4D2B-A91E-2ACB7D90E7CC}" type="datetime1">
               <a:rPr lang="en-US" smtClean="0"/>
-              <a:t>1/9/2019</a:t>
+              <a:t>1/13/2019</a:t>
             </a:fld>
             <a:endParaRPr lang="en-US"/>
           </a:p>
@@ -4071,7 +4071,7 @@
           <a:p>
             <a:fld id="{00A5D59F-6FC3-492C-BAE3-F50C9D1FBA31}" type="datetime1">
               <a:rPr lang="en-US" smtClean="0"/>
-              <a:t>1/9/2019</a:t>
+              <a:t>1/13/2019</a:t>
             </a:fld>
             <a:endParaRPr lang="en-US"/>
           </a:p>
@@ -4364,7 +4364,7 @@
           <a:p>
             <a:fld id="{CD78B45F-E474-4F2F-801A-58FC9FE22655}" type="datetime1">
               <a:rPr lang="en-US" smtClean="0"/>
-              <a:t>1/9/2019</a:t>
+              <a:t>1/13/2019</a:t>
             </a:fld>
             <a:endParaRPr lang="en-US"/>
           </a:p>
@@ -4638,7 +4638,7 @@
           <a:p>
             <a:fld id="{FDF35450-A835-4587-8F84-782057674F92}" type="datetime1">
               <a:rPr lang="en-US" smtClean="0"/>
-              <a:t>1/9/2019</a:t>
+              <a:t>1/13/2019</a:t>
             </a:fld>
             <a:endParaRPr lang="en-US"/>
           </a:p>
@@ -4760,17 +4760,17 @@
           </a:ln>
           <a:extLst>
             <a:ext uri="{FAA26D3D-D897-4be2-8F04-BA451C77F1D7}">
-              <ma14:placeholderFlag xmlns:ma14="http://schemas.microsoft.com/office/mac/drawingml/2011/main" xmlns="" val="1"/>
+              <ma14:placeholderFlag xmlns="" xmlns:ma14="http://schemas.microsoft.com/office/mac/drawingml/2011/main" val="1"/>
             </a:ext>
             <a:ext uri="{909E8E84-426E-40dd-AFC4-6F175D3DCCD1}">
-              <a14:hiddenFill xmlns:a14="http://schemas.microsoft.com/office/drawing/2010/main" xmlns="">
+              <a14:hiddenFill xmlns="" xmlns:a14="http://schemas.microsoft.com/office/drawing/2010/main">
                 <a:solidFill>
                   <a:srgbClr val="FFFFFF"/>
                 </a:solidFill>
               </a14:hiddenFill>
             </a:ext>
             <a:ext uri="{91240B29-F687-4f45-9708-019B960494DF}">
-              <a14:hiddenLine xmlns:a14="http://schemas.microsoft.com/office/drawing/2010/main" xmlns="" w="9525">
+              <a14:hiddenLine xmlns="" xmlns:a14="http://schemas.microsoft.com/office/drawing/2010/main" w="9525">
                 <a:solidFill>
                   <a:srgbClr val="000000"/>
                 </a:solidFill>
@@ -4822,17 +4822,17 @@
           </a:ln>
           <a:extLst>
             <a:ext uri="{FAA26D3D-D897-4be2-8F04-BA451C77F1D7}">
-              <ma14:placeholderFlag xmlns:ma14="http://schemas.microsoft.com/office/mac/drawingml/2011/main" xmlns="" val="1"/>
+              <ma14:placeholderFlag xmlns="" xmlns:ma14="http://schemas.microsoft.com/office/mac/drawingml/2011/main" val="1"/>
             </a:ext>
             <a:ext uri="{909E8E84-426E-40dd-AFC4-6F175D3DCCD1}">
-              <a14:hiddenFill xmlns:a14="http://schemas.microsoft.com/office/drawing/2010/main" xmlns="">
+              <a14:hiddenFill xmlns="" xmlns:a14="http://schemas.microsoft.com/office/drawing/2010/main">
                 <a:solidFill>
                   <a:srgbClr val="FFFFFF"/>
                 </a:solidFill>
               </a14:hiddenFill>
             </a:ext>
             <a:ext uri="{91240B29-F687-4f45-9708-019B960494DF}">
-              <a14:hiddenLine xmlns:a14="http://schemas.microsoft.com/office/drawing/2010/main" xmlns="" w="9525">
+              <a14:hiddenLine xmlns="" xmlns:a14="http://schemas.microsoft.com/office/drawing/2010/main" w="9525">
                 <a:solidFill>
                   <a:srgbClr val="000000"/>
                 </a:solidFill>
@@ -4932,7 +4932,7 @@
           <a:p>
             <a:fld id="{F6803E09-2A09-4EEA-8E99-292225B5EDFC}" type="datetime1">
               <a:rPr lang="en-US" smtClean="0"/>
-              <a:t>1/9/2019</a:t>
+              <a:t>1/13/2019</a:t>
             </a:fld>
             <a:endParaRPr lang="en-US"/>
           </a:p>
@@ -5100,7 +5100,7 @@
           </a:ln>
           <a:extLst>
             <a:ext uri="{909E8E84-426E-40dd-AFC4-6F175D3DCCD1}">
-              <a14:hiddenFill xmlns:a14="http://schemas.microsoft.com/office/drawing/2010/main" xmlns="">
+              <a14:hiddenFill xmlns="" xmlns:a14="http://schemas.microsoft.com/office/drawing/2010/main">
                 <a:solidFill>
                   <a:srgbClr val="FFFFFF"/>
                 </a:solidFill>
@@ -5143,7 +5143,7 @@
           </a:ln>
           <a:extLst>
             <a:ext uri="{909E8E84-426E-40dd-AFC4-6F175D3DCCD1}">
-              <a14:hiddenFill xmlns:a14="http://schemas.microsoft.com/office/drawing/2010/main" xmlns="">
+              <a14:hiddenFill xmlns="" xmlns:a14="http://schemas.microsoft.com/office/drawing/2010/main">
                 <a:noFill/>
               </a14:hiddenFill>
             </a:ext>
@@ -5628,7 +5628,7 @@
           <p:cNvPr id="2" name="Title 1">
             <a:extLst>
               <a:ext uri="{FF2B5EF4-FFF2-40B4-BE49-F238E27FC236}">
-                <a16:creationId xmlns:a16="http://schemas.microsoft.com/office/drawing/2014/main" id="{4819A39B-28BB-4873-9914-8FEE18891DD4}"/>
+                <a16:creationId xmlns:a16="http://schemas.microsoft.com/office/drawing/2014/main" xmlns="" id="{4819A39B-28BB-4873-9914-8FEE18891DD4}"/>
               </a:ext>
             </a:extLst>
           </p:cNvPr>
@@ -5659,7 +5659,7 @@
           <p:cNvPr id="5" name="Subtitle 2">
             <a:extLst>
               <a:ext uri="{FF2B5EF4-FFF2-40B4-BE49-F238E27FC236}">
-                <a16:creationId xmlns:a16="http://schemas.microsoft.com/office/drawing/2014/main" id="{2BECD79D-0B3A-44C2-A155-03EC2A6A5D3B}"/>
+                <a16:creationId xmlns:a16="http://schemas.microsoft.com/office/drawing/2014/main" xmlns="" id="{2BECD79D-0B3A-44C2-A155-03EC2A6A5D3B}"/>
               </a:ext>
             </a:extLst>
           </p:cNvPr>
@@ -5682,17 +5682,17 @@
           </a:ln>
           <a:extLst>
             <a:ext uri="{FAA26D3D-D897-4be2-8F04-BA451C77F1D7}">
-              <ma14:placeholderFlag xmlns="" xmlns:ma14="http://schemas.microsoft.com/office/mac/drawingml/2011/main" val="1"/>
+              <ma14:placeholderFlag xmlns:ma14="http://schemas.microsoft.com/office/mac/drawingml/2011/main" xmlns="" val="1"/>
             </a:ext>
             <a:ext uri="{909E8E84-426E-40dd-AFC4-6F175D3DCCD1}">
-              <a14:hiddenFill xmlns="" xmlns:a14="http://schemas.microsoft.com/office/drawing/2010/main">
+              <a14:hiddenFill xmlns:a14="http://schemas.microsoft.com/office/drawing/2010/main" xmlns="">
                 <a:solidFill>
                   <a:srgbClr val="FFFFFF"/>
                 </a:solidFill>
               </a14:hiddenFill>
             </a:ext>
             <a:ext uri="{91240B29-F687-4f45-9708-019B960494DF}">
-              <a14:hiddenLine xmlns="" xmlns:a14="http://schemas.microsoft.com/office/drawing/2010/main" w="9525">
+              <a14:hiddenLine xmlns:a14="http://schemas.microsoft.com/office/drawing/2010/main" xmlns="" w="9525">
                 <a:solidFill>
                   <a:srgbClr val="000000"/>
                 </a:solidFill>
@@ -7419,7 +7419,7 @@
           <p:cNvPr id="2" name="Title 1">
             <a:extLst>
               <a:ext uri="{FF2B5EF4-FFF2-40B4-BE49-F238E27FC236}">
-                <a16:creationId xmlns:a16="http://schemas.microsoft.com/office/drawing/2014/main" id="{BB90F14D-5220-4A62-A7F3-F87698065F0F}"/>
+                <a16:creationId xmlns:a16="http://schemas.microsoft.com/office/drawing/2014/main" xmlns="" id="{BB90F14D-5220-4A62-A7F3-F87698065F0F}"/>
               </a:ext>
             </a:extLst>
           </p:cNvPr>
@@ -7447,7 +7447,7 @@
           <p:cNvPr id="3" name="Content Placeholder 2">
             <a:extLst>
               <a:ext uri="{FF2B5EF4-FFF2-40B4-BE49-F238E27FC236}">
-                <a16:creationId xmlns:a16="http://schemas.microsoft.com/office/drawing/2014/main" id="{CA6E65FC-E3CC-46B1-81FE-E383DBE52F38}"/>
+                <a16:creationId xmlns:a16="http://schemas.microsoft.com/office/drawing/2014/main" xmlns="" id="{CA6E65FC-E3CC-46B1-81FE-E383DBE52F38}"/>
               </a:ext>
             </a:extLst>
           </p:cNvPr>
@@ -7512,7 +7512,7 @@
           <p:cNvPr id="4" name="Slide Number Placeholder 3">
             <a:extLst>
               <a:ext uri="{FF2B5EF4-FFF2-40B4-BE49-F238E27FC236}">
-                <a16:creationId xmlns:a16="http://schemas.microsoft.com/office/drawing/2014/main" id="{F93221D8-CCBC-41F1-B49A-9F93987F2405}"/>
+                <a16:creationId xmlns:a16="http://schemas.microsoft.com/office/drawing/2014/main" xmlns="" id="{F93221D8-CCBC-41F1-B49A-9F93987F2405}"/>
               </a:ext>
             </a:extLst>
           </p:cNvPr>
@@ -7572,7 +7572,7 @@
           <p:cNvPr id="2" name="Title 1">
             <a:extLst>
               <a:ext uri="{FF2B5EF4-FFF2-40B4-BE49-F238E27FC236}">
-                <a16:creationId xmlns:a16="http://schemas.microsoft.com/office/drawing/2014/main" id="{4819A39B-28BB-4873-9914-8FEE18891DD4}"/>
+                <a16:creationId xmlns:a16="http://schemas.microsoft.com/office/drawing/2014/main" xmlns="" id="{4819A39B-28BB-4873-9914-8FEE18891DD4}"/>
               </a:ext>
             </a:extLst>
           </p:cNvPr>
@@ -7603,7 +7603,7 @@
           <p:cNvPr id="5" name="Subtitle 2">
             <a:extLst>
               <a:ext uri="{FF2B5EF4-FFF2-40B4-BE49-F238E27FC236}">
-                <a16:creationId xmlns:a16="http://schemas.microsoft.com/office/drawing/2014/main" id="{2BECD79D-0B3A-44C2-A155-03EC2A6A5D3B}"/>
+                <a16:creationId xmlns:a16="http://schemas.microsoft.com/office/drawing/2014/main" xmlns="" id="{2BECD79D-0B3A-44C2-A155-03EC2A6A5D3B}"/>
               </a:ext>
             </a:extLst>
           </p:cNvPr>
@@ -7626,17 +7626,17 @@
           </a:ln>
           <a:extLst>
             <a:ext uri="{FAA26D3D-D897-4be2-8F04-BA451C77F1D7}">
-              <ma14:placeholderFlag xmlns:ma14="http://schemas.microsoft.com/office/mac/drawingml/2011/main" xmlns="" val="1"/>
+              <ma14:placeholderFlag xmlns="" xmlns:ma14="http://schemas.microsoft.com/office/mac/drawingml/2011/main" val="1"/>
             </a:ext>
             <a:ext uri="{909E8E84-426E-40dd-AFC4-6F175D3DCCD1}">
-              <a14:hiddenFill xmlns:a14="http://schemas.microsoft.com/office/drawing/2010/main" xmlns="">
+              <a14:hiddenFill xmlns="" xmlns:a14="http://schemas.microsoft.com/office/drawing/2010/main">
                 <a:solidFill>
                   <a:srgbClr val="FFFFFF"/>
                 </a:solidFill>
               </a14:hiddenFill>
             </a:ext>
             <a:ext uri="{91240B29-F687-4f45-9708-019B960494DF}">
-              <a14:hiddenLine xmlns:a14="http://schemas.microsoft.com/office/drawing/2010/main" xmlns="" w="9525">
+              <a14:hiddenLine xmlns="" xmlns:a14="http://schemas.microsoft.com/office/drawing/2010/main" w="9525">
                 <a:solidFill>
                   <a:srgbClr val="000000"/>
                 </a:solidFill>
@@ -8152,7 +8152,7 @@
           <a:graphicData uri="http://schemas.openxmlformats.org/presentationml/2006/ole">
             <mc:AlternateContent xmlns:mc="http://schemas.openxmlformats.org/markup-compatibility/2006">
               <mc:Choice xmlns:v="urn:schemas-microsoft-com:vml" Requires="v">
-                <p:oleObj spid="_x0000_s1050" name="Equation" r:id="rId3" imgW="812447" imgH="228501" progId="Equation.3">
+                <p:oleObj spid="_x0000_s1053" name="Equation" r:id="rId3" imgW="812447" imgH="228501" progId="Equation.3">
                   <p:embed/>
                 </p:oleObj>
               </mc:Choice>
@@ -8195,14 +8195,14 @@
                       <a:effectLst/>
                       <a:extLst>
                         <a:ext uri="{909E8E84-426E-40dd-AFC4-6F175D3DCCD1}">
-                          <a14:hiddenFill xmlns:a14="http://schemas.microsoft.com/office/drawing/2010/main" xmlns="">
+                          <a14:hiddenFill xmlns="" xmlns:a14="http://schemas.microsoft.com/office/drawing/2010/main">
                             <a:solidFill>
                               <a:srgbClr val="FFFFFF"/>
                             </a:solidFill>
                           </a14:hiddenFill>
                         </a:ext>
                         <a:ext uri="{91240B29-F687-4f45-9708-019B960494DF}">
-                          <a14:hiddenLine xmlns:a14="http://schemas.microsoft.com/office/drawing/2010/main" xmlns="" w="9525">
+                          <a14:hiddenLine xmlns="" xmlns:a14="http://schemas.microsoft.com/office/drawing/2010/main" w="9525">
                             <a:solidFill>
                               <a:srgbClr val="000000"/>
                             </a:solidFill>
@@ -8212,7 +8212,7 @@
                           </a14:hiddenLine>
                         </a:ext>
                         <a:ext uri="{AF507438-7753-43e0-B8FC-AC1667EBCBE1}">
-                          <a14:hiddenEffects xmlns:a14="http://schemas.microsoft.com/office/drawing/2010/main" xmlns="">
+                          <a14:hiddenEffects xmlns="" xmlns:a14="http://schemas.microsoft.com/office/drawing/2010/main">
                             <a:effectLst>
                               <a:outerShdw blurRad="63500" dist="38099" dir="2700000" algn="ctr" rotWithShape="0">
                                 <a:srgbClr val="000000">
@@ -8247,7 +8247,7 @@
           <a:graphicData uri="http://schemas.openxmlformats.org/presentationml/2006/ole">
             <mc:AlternateContent xmlns:mc="http://schemas.openxmlformats.org/markup-compatibility/2006">
               <mc:Choice xmlns:v="urn:schemas-microsoft-com:vml" Requires="v">
-                <p:oleObj spid="_x0000_s1051" name="Equation" r:id="rId5" imgW="761669" imgH="228501" progId="Equation.3">
+                <p:oleObj spid="_x0000_s1054" name="Equation" r:id="rId5" imgW="761669" imgH="228501" progId="Equation.3">
                   <p:embed/>
                 </p:oleObj>
               </mc:Choice>
@@ -8290,14 +8290,14 @@
                       <a:effectLst/>
                       <a:extLst>
                         <a:ext uri="{909E8E84-426E-40dd-AFC4-6F175D3DCCD1}">
-                          <a14:hiddenFill xmlns:a14="http://schemas.microsoft.com/office/drawing/2010/main" xmlns="">
+                          <a14:hiddenFill xmlns="" xmlns:a14="http://schemas.microsoft.com/office/drawing/2010/main">
                             <a:solidFill>
                               <a:schemeClr val="accent1"/>
                             </a:solidFill>
                           </a14:hiddenFill>
                         </a:ext>
                         <a:ext uri="{91240B29-F687-4f45-9708-019B960494DF}">
-                          <a14:hiddenLine xmlns:a14="http://schemas.microsoft.com/office/drawing/2010/main" xmlns="" w="9525">
+                          <a14:hiddenLine xmlns="" xmlns:a14="http://schemas.microsoft.com/office/drawing/2010/main" w="9525">
                             <a:solidFill>
                               <a:schemeClr val="tx1"/>
                             </a:solidFill>
@@ -8307,7 +8307,7 @@
                           </a14:hiddenLine>
                         </a:ext>
                         <a:ext uri="{AF507438-7753-43e0-B8FC-AC1667EBCBE1}">
-                          <a14:hiddenEffects xmlns:a14="http://schemas.microsoft.com/office/drawing/2010/main" xmlns="">
+                          <a14:hiddenEffects xmlns="" xmlns:a14="http://schemas.microsoft.com/office/drawing/2010/main">
                             <a:effectLst>
                               <a:outerShdw blurRad="63500" dist="38099" dir="2700000" algn="ctr" rotWithShape="0">
                                 <a:schemeClr val="bg2">
@@ -8344,7 +8344,7 @@
           <a:graphicData uri="http://schemas.openxmlformats.org/presentationml/2006/ole">
             <mc:AlternateContent xmlns:mc="http://schemas.openxmlformats.org/markup-compatibility/2006">
               <mc:Choice xmlns:v="urn:schemas-microsoft-com:vml" Requires="v">
-                <p:oleObj spid="_x0000_s1052" r:id="rId7" imgW="1180588" imgH="710891" progId="Equation.3">
+                <p:oleObj spid="_x0000_s1055" r:id="rId7" imgW="1180588" imgH="710891" progId="Equation.3">
                   <p:embed/>
                 </p:oleObj>
               </mc:Choice>
@@ -8387,14 +8387,14 @@
                       <a:effectLst/>
                       <a:extLst>
                         <a:ext uri="{909E8E84-426E-40dd-AFC4-6F175D3DCCD1}">
-                          <a14:hiddenFill xmlns:a14="http://schemas.microsoft.com/office/drawing/2010/main" xmlns="">
+                          <a14:hiddenFill xmlns="" xmlns:a14="http://schemas.microsoft.com/office/drawing/2010/main">
                             <a:solidFill>
                               <a:srgbClr val="FFFFFF"/>
                             </a:solidFill>
                           </a14:hiddenFill>
                         </a:ext>
                         <a:ext uri="{91240B29-F687-4f45-9708-019B960494DF}">
-                          <a14:hiddenLine xmlns:a14="http://schemas.microsoft.com/office/drawing/2010/main" xmlns="" w="9525">
+                          <a14:hiddenLine xmlns="" xmlns:a14="http://schemas.microsoft.com/office/drawing/2010/main" w="9525">
                             <a:solidFill>
                               <a:srgbClr val="000000"/>
                             </a:solidFill>
@@ -8404,7 +8404,7 @@
                           </a14:hiddenLine>
                         </a:ext>
                         <a:ext uri="{AF507438-7753-43e0-B8FC-AC1667EBCBE1}">
-                          <a14:hiddenEffects xmlns:a14="http://schemas.microsoft.com/office/drawing/2010/main" xmlns="">
+                          <a14:hiddenEffects xmlns="" xmlns:a14="http://schemas.microsoft.com/office/drawing/2010/main">
                             <a:effectLst>
                               <a:outerShdw blurRad="63500" dist="38099" dir="2700000" algn="ctr" rotWithShape="0">
                                 <a:srgbClr val="808080">
@@ -8445,14 +8445,14 @@
           </a:ln>
           <a:extLst>
             <a:ext uri="{909E8E84-426E-40dd-AFC4-6F175D3DCCD1}">
-              <a14:hiddenFill xmlns:a14="http://schemas.microsoft.com/office/drawing/2010/main" xmlns="">
+              <a14:hiddenFill xmlns="" xmlns:a14="http://schemas.microsoft.com/office/drawing/2010/main">
                 <a:solidFill>
                   <a:srgbClr val="FFFFFF"/>
                 </a:solidFill>
               </a14:hiddenFill>
             </a:ext>
             <a:ext uri="{91240B29-F687-4f45-9708-019B960494DF}">
-              <a14:hiddenLine xmlns:a14="http://schemas.microsoft.com/office/drawing/2010/main" xmlns="" w="9525">
+              <a14:hiddenLine xmlns="" xmlns:a14="http://schemas.microsoft.com/office/drawing/2010/main" w="9525">
                 <a:solidFill>
                   <a:srgbClr val="000000"/>
                 </a:solidFill>
@@ -9032,7 +9032,7 @@
           <a:graphicData uri="http://schemas.openxmlformats.org/presentationml/2006/ole">
             <mc:AlternateContent xmlns:mc="http://schemas.openxmlformats.org/markup-compatibility/2006">
               <mc:Choice xmlns:v="urn:schemas-microsoft-com:vml" Requires="v">
-                <p:oleObj spid="_x0000_s2068" name="Equation" r:id="rId3" imgW="1002960" imgH="228600" progId="Equation.DSMT4">
+                <p:oleObj spid="_x0000_s2070" name="Equation" r:id="rId3" imgW="1002960" imgH="228600" progId="Equation.DSMT4">
                   <p:embed/>
                 </p:oleObj>
               </mc:Choice>
@@ -9069,14 +9069,14 @@
                       <a:effectLst/>
                       <a:extLst>
                         <a:ext uri="{909E8E84-426E-40dd-AFC4-6F175D3DCCD1}">
-                          <a14:hiddenFill xmlns:a14="http://schemas.microsoft.com/office/drawing/2010/main" xmlns="">
+                          <a14:hiddenFill xmlns="" xmlns:a14="http://schemas.microsoft.com/office/drawing/2010/main">
                             <a:solidFill>
                               <a:srgbClr val="FFFFFF"/>
                             </a:solidFill>
                           </a14:hiddenFill>
                         </a:ext>
                         <a:ext uri="{91240B29-F687-4f45-9708-019B960494DF}">
-                          <a14:hiddenLine xmlns:a14="http://schemas.microsoft.com/office/drawing/2010/main" xmlns="" w="9525">
+                          <a14:hiddenLine xmlns="" xmlns:a14="http://schemas.microsoft.com/office/drawing/2010/main" w="9525">
                             <a:solidFill>
                               <a:srgbClr val="000000"/>
                             </a:solidFill>
@@ -9086,7 +9086,7 @@
                           </a14:hiddenLine>
                         </a:ext>
                         <a:ext uri="{AF507438-7753-43e0-B8FC-AC1667EBCBE1}">
-                          <a14:hiddenEffects xmlns:a14="http://schemas.microsoft.com/office/drawing/2010/main" xmlns="">
+                          <a14:hiddenEffects xmlns="" xmlns:a14="http://schemas.microsoft.com/office/drawing/2010/main">
                             <a:effectLst>
                               <a:outerShdw blurRad="63500" dist="38099" dir="2700000" algn="ctr" rotWithShape="0">
                                 <a:srgbClr val="000000">
@@ -9128,7 +9128,7 @@
           <a:graphicData uri="http://schemas.openxmlformats.org/presentationml/2006/ole">
             <mc:AlternateContent xmlns:mc="http://schemas.openxmlformats.org/markup-compatibility/2006">
               <mc:Choice xmlns:v="urn:schemas-microsoft-com:vml" Requires="v">
-                <p:oleObj spid="_x0000_s2069" name="Equation" r:id="rId5" imgW="1028520" imgH="203040" progId="Equation.DSMT4">
+                <p:oleObj spid="_x0000_s2071" name="Equation" r:id="rId5" imgW="1028520" imgH="203040" progId="Equation.DSMT4">
                   <p:embed/>
                 </p:oleObj>
               </mc:Choice>
@@ -9165,14 +9165,14 @@
                       <a:effectLst/>
                       <a:extLst>
                         <a:ext uri="{909E8E84-426E-40dd-AFC4-6F175D3DCCD1}">
-                          <a14:hiddenFill xmlns:a14="http://schemas.microsoft.com/office/drawing/2010/main" xmlns="">
+                          <a14:hiddenFill xmlns="" xmlns:a14="http://schemas.microsoft.com/office/drawing/2010/main">
                             <a:solidFill>
                               <a:srgbClr val="FFFFFF"/>
                             </a:solidFill>
                           </a14:hiddenFill>
                         </a:ext>
                         <a:ext uri="{91240B29-F687-4f45-9708-019B960494DF}">
-                          <a14:hiddenLine xmlns:a14="http://schemas.microsoft.com/office/drawing/2010/main" xmlns="" w="9525">
+                          <a14:hiddenLine xmlns="" xmlns:a14="http://schemas.microsoft.com/office/drawing/2010/main" w="9525">
                             <a:solidFill>
                               <a:srgbClr val="000000"/>
                             </a:solidFill>
@@ -9182,7 +9182,7 @@
                           </a14:hiddenLine>
                         </a:ext>
                         <a:ext uri="{AF507438-7753-43e0-B8FC-AC1667EBCBE1}">
-                          <a14:hiddenEffects xmlns:a14="http://schemas.microsoft.com/office/drawing/2010/main" xmlns="">
+                          <a14:hiddenEffects xmlns="" xmlns:a14="http://schemas.microsoft.com/office/drawing/2010/main">
                             <a:effectLst>
                               <a:outerShdw blurRad="63500" dist="38099" dir="2700000" algn="ctr" rotWithShape="0">
                                 <a:srgbClr val="808080">
@@ -9223,14 +9223,14 @@
           </a:ln>
           <a:extLst>
             <a:ext uri="{909E8E84-426E-40dd-AFC4-6F175D3DCCD1}">
-              <a14:hiddenFill xmlns:a14="http://schemas.microsoft.com/office/drawing/2010/main" xmlns="">
+              <a14:hiddenFill xmlns="" xmlns:a14="http://schemas.microsoft.com/office/drawing/2010/main">
                 <a:solidFill>
                   <a:srgbClr val="FFFFFF"/>
                 </a:solidFill>
               </a14:hiddenFill>
             </a:ext>
             <a:ext uri="{91240B29-F687-4f45-9708-019B960494DF}">
-              <a14:hiddenLine xmlns:a14="http://schemas.microsoft.com/office/drawing/2010/main" xmlns="" w="9525">
+              <a14:hiddenLine xmlns="" xmlns:a14="http://schemas.microsoft.com/office/drawing/2010/main" w="9525">
                 <a:solidFill>
                   <a:srgbClr val="000000"/>
                 </a:solidFill>
@@ -9594,14 +9594,14 @@
           </a:ln>
           <a:extLst>
             <a:ext uri="{909E8E84-426E-40dd-AFC4-6F175D3DCCD1}">
-              <a14:hiddenFill xmlns:a14="http://schemas.microsoft.com/office/drawing/2010/main" xmlns="">
+              <a14:hiddenFill xmlns="" xmlns:a14="http://schemas.microsoft.com/office/drawing/2010/main">
                 <a:solidFill>
                   <a:srgbClr val="FFFFFF"/>
                 </a:solidFill>
               </a14:hiddenFill>
             </a:ext>
             <a:ext uri="{91240B29-F687-4f45-9708-019B960494DF}">
-              <a14:hiddenLine xmlns:a14="http://schemas.microsoft.com/office/drawing/2010/main" xmlns="" w="9525">
+              <a14:hiddenLine xmlns="" xmlns:a14="http://schemas.microsoft.com/office/drawing/2010/main" w="9525">
                 <a:solidFill>
                   <a:srgbClr val="000000"/>
                 </a:solidFill>
@@ -10208,10 +10208,6 @@
               </a:rPr>
               <a:t>)</a:t>
             </a:r>
-            <a:endParaRPr lang="en-US" sz="1600" dirty="0">
-              <a:latin typeface="Courier New" panose="02070309020205020404" pitchFamily="49" charset="0"/>
-              <a:cs typeface="Courier New" panose="02070309020205020404" pitchFamily="49" charset="0"/>
-            </a:endParaRPr>
           </a:p>
         </p:txBody>
       </p:sp>
@@ -10412,11 +10408,7 @@
           <a:p>
             <a:r>
               <a:rPr lang="en-US" dirty="0" smtClean="0"/>
-              <a:t>We use the samples to approximate quantities of </a:t>
-            </a:r>
-            <a:r>
-              <a:rPr lang="en-US" dirty="0" smtClean="0"/>
-              <a:t>interest</a:t>
+              <a:t>We use the samples to approximate quantities of interest</a:t>
             </a:r>
           </a:p>
           <a:p>
@@ -10577,8 +10569,13 @@
             </a:r>
             <a:r>
               <a:rPr lang="en-US" dirty="0" smtClean="0"/>
-              <a:t>) parameterization where tau=1/sigma.</a:t>
-            </a:r>
+              <a:t>) parameterization where </a:t>
+            </a:r>
+            <a:r>
+              <a:rPr lang="en-US" dirty="0" smtClean="0"/>
+              <a:t>tau=1/sigma.</a:t>
+            </a:r>
+            <a:endParaRPr lang="en-US" dirty="0" smtClean="0"/>
           </a:p>
           <a:p>
             <a:pPr marL="514350" indent="-514350">
@@ -10647,7 +10644,7 @@
           <p:cNvPr id="2" name="Title 1">
             <a:extLst>
               <a:ext uri="{FF2B5EF4-FFF2-40B4-BE49-F238E27FC236}">
-                <a16:creationId xmlns:a16="http://schemas.microsoft.com/office/drawing/2014/main" id="{C976E5B5-F024-4D7C-9711-9BEA5F3AA682}"/>
+                <a16:creationId xmlns:a16="http://schemas.microsoft.com/office/drawing/2014/main" xmlns="" id="{C976E5B5-F024-4D7C-9711-9BEA5F3AA682}"/>
               </a:ext>
             </a:extLst>
           </p:cNvPr>
@@ -10676,7 +10673,7 @@
           <p:cNvPr id="3" name="Content Placeholder 2">
             <a:extLst>
               <a:ext uri="{FF2B5EF4-FFF2-40B4-BE49-F238E27FC236}">
-                <a16:creationId xmlns:a16="http://schemas.microsoft.com/office/drawing/2014/main" id="{B674CA99-AD0B-472B-BD2F-AF6AA7DE490B}"/>
+                <a16:creationId xmlns:a16="http://schemas.microsoft.com/office/drawing/2014/main" xmlns="" id="{B674CA99-AD0B-472B-BD2F-AF6AA7DE490B}"/>
               </a:ext>
             </a:extLst>
           </p:cNvPr>
@@ -10761,7 +10758,7 @@
           <p:cNvPr id="4" name="Slide Number Placeholder 3">
             <a:extLst>
               <a:ext uri="{FF2B5EF4-FFF2-40B4-BE49-F238E27FC236}">
-                <a16:creationId xmlns:a16="http://schemas.microsoft.com/office/drawing/2014/main" id="{6F6CFCEE-97D6-460E-9635-2B1BFC0C65FA}"/>
+                <a16:creationId xmlns:a16="http://schemas.microsoft.com/office/drawing/2014/main" xmlns="" id="{6F6CFCEE-97D6-460E-9635-2B1BFC0C65FA}"/>
               </a:ext>
             </a:extLst>
           </p:cNvPr>
@@ -10820,7 +10817,7 @@
           <p:cNvPr id="2" name="Title 1">
             <a:extLst>
               <a:ext uri="{FF2B5EF4-FFF2-40B4-BE49-F238E27FC236}">
-                <a16:creationId xmlns:a16="http://schemas.microsoft.com/office/drawing/2014/main" id="{4432A1B1-8BA2-4590-B91C-E46E40D4DFB4}"/>
+                <a16:creationId xmlns:a16="http://schemas.microsoft.com/office/drawing/2014/main" xmlns="" id="{4432A1B1-8BA2-4590-B91C-E46E40D4DFB4}"/>
               </a:ext>
             </a:extLst>
           </p:cNvPr>
@@ -10861,7 +10858,7 @@
           <p:cNvPr id="3" name="Content Placeholder 2">
             <a:extLst>
               <a:ext uri="{FF2B5EF4-FFF2-40B4-BE49-F238E27FC236}">
-                <a16:creationId xmlns:a16="http://schemas.microsoft.com/office/drawing/2014/main" id="{F3D5A96F-89B9-47B5-9E10-345EF073461D}"/>
+                <a16:creationId xmlns:a16="http://schemas.microsoft.com/office/drawing/2014/main" xmlns="" id="{F3D5A96F-89B9-47B5-9E10-345EF073461D}"/>
               </a:ext>
             </a:extLst>
           </p:cNvPr>
@@ -10889,7 +10886,7 @@
           <p:cNvPr id="4" name="Slide Number Placeholder 3">
             <a:extLst>
               <a:ext uri="{FF2B5EF4-FFF2-40B4-BE49-F238E27FC236}">
-                <a16:creationId xmlns:a16="http://schemas.microsoft.com/office/drawing/2014/main" id="{45FEC1D0-C942-4DB7-ACBF-32ADFCD8FDBD}"/>
+                <a16:creationId xmlns:a16="http://schemas.microsoft.com/office/drawing/2014/main" xmlns="" id="{45FEC1D0-C942-4DB7-ACBF-32ADFCD8FDBD}"/>
               </a:ext>
             </a:extLst>
           </p:cNvPr>
@@ -10919,7 +10916,7 @@
           <p:cNvPr id="5" name="Picture 4">
             <a:extLst>
               <a:ext uri="{FF2B5EF4-FFF2-40B4-BE49-F238E27FC236}">
-                <a16:creationId xmlns:a16="http://schemas.microsoft.com/office/drawing/2014/main" id="{7106B806-F770-4D8A-82BF-705D0968D767}"/>
+                <a16:creationId xmlns:a16="http://schemas.microsoft.com/office/drawing/2014/main" xmlns="" id="{7106B806-F770-4D8A-82BF-705D0968D767}"/>
               </a:ext>
             </a:extLst>
           </p:cNvPr>
@@ -10948,7 +10945,7 @@
           <p:cNvPr id="9" name="Group 8">
             <a:extLst>
               <a:ext uri="{FF2B5EF4-FFF2-40B4-BE49-F238E27FC236}">
-                <a16:creationId xmlns:a16="http://schemas.microsoft.com/office/drawing/2014/main" id="{8F6F2399-4203-4B1C-AA82-F48653969789}"/>
+                <a16:creationId xmlns:a16="http://schemas.microsoft.com/office/drawing/2014/main" xmlns="" id="{8F6F2399-4203-4B1C-AA82-F48653969789}"/>
               </a:ext>
             </a:extLst>
           </p:cNvPr>
@@ -10968,7 +10965,7 @@
             <p:cNvPr id="6" name="Rectangle 5">
               <a:extLst>
                 <a:ext uri="{FF2B5EF4-FFF2-40B4-BE49-F238E27FC236}">
-                  <a16:creationId xmlns:a16="http://schemas.microsoft.com/office/drawing/2014/main" id="{6A958FFF-7B97-4342-91B7-8638B529CDD5}"/>
+                  <a16:creationId xmlns:a16="http://schemas.microsoft.com/office/drawing/2014/main" xmlns="" id="{6A958FFF-7B97-4342-91B7-8638B529CDD5}"/>
                 </a:ext>
               </a:extLst>
             </p:cNvPr>
@@ -11020,7 +11017,7 @@
             <p:cNvPr id="8" name="TextBox 7">
               <a:extLst>
                 <a:ext uri="{FF2B5EF4-FFF2-40B4-BE49-F238E27FC236}">
-                  <a16:creationId xmlns:a16="http://schemas.microsoft.com/office/drawing/2014/main" id="{A7E2B8AF-E9A2-452C-B355-A9F4DC58D25F}"/>
+                  <a16:creationId xmlns:a16="http://schemas.microsoft.com/office/drawing/2014/main" xmlns="" id="{A7E2B8AF-E9A2-452C-B355-A9F4DC58D25F}"/>
                 </a:ext>
               </a:extLst>
             </p:cNvPr>
@@ -11081,7 +11078,7 @@
           <p:cNvPr id="11" name="Group 10">
             <a:extLst>
               <a:ext uri="{FF2B5EF4-FFF2-40B4-BE49-F238E27FC236}">
-                <a16:creationId xmlns:a16="http://schemas.microsoft.com/office/drawing/2014/main" id="{9C07D298-3974-4E79-B799-CF2D6DC88081}"/>
+                <a16:creationId xmlns:a16="http://schemas.microsoft.com/office/drawing/2014/main" xmlns="" id="{9C07D298-3974-4E79-B799-CF2D6DC88081}"/>
               </a:ext>
             </a:extLst>
           </p:cNvPr>
@@ -11101,7 +11098,7 @@
             <p:cNvPr id="7" name="Rectangle 6">
               <a:extLst>
                 <a:ext uri="{FF2B5EF4-FFF2-40B4-BE49-F238E27FC236}">
-                  <a16:creationId xmlns:a16="http://schemas.microsoft.com/office/drawing/2014/main" id="{33B9F385-05BE-4DCC-BA10-EE2CFA8EFF9B}"/>
+                  <a16:creationId xmlns:a16="http://schemas.microsoft.com/office/drawing/2014/main" xmlns="" id="{33B9F385-05BE-4DCC-BA10-EE2CFA8EFF9B}"/>
                 </a:ext>
               </a:extLst>
             </p:cNvPr>
@@ -11153,7 +11150,7 @@
             <p:cNvPr id="10" name="TextBox 9">
               <a:extLst>
                 <a:ext uri="{FF2B5EF4-FFF2-40B4-BE49-F238E27FC236}">
-                  <a16:creationId xmlns:a16="http://schemas.microsoft.com/office/drawing/2014/main" id="{3B1BEE2A-4CB2-4072-84F2-E07299BCB66F}"/>
+                  <a16:creationId xmlns:a16="http://schemas.microsoft.com/office/drawing/2014/main" xmlns="" id="{3B1BEE2A-4CB2-4072-84F2-E07299BCB66F}"/>
                 </a:ext>
               </a:extLst>
             </p:cNvPr>
@@ -11364,7 +11361,7 @@
           <p:cNvPr id="2" name="Title 1">
             <a:extLst>
               <a:ext uri="{FF2B5EF4-FFF2-40B4-BE49-F238E27FC236}">
-                <a16:creationId xmlns:a16="http://schemas.microsoft.com/office/drawing/2014/main" id="{4432A1B1-8BA2-4590-B91C-E46E40D4DFB4}"/>
+                <a16:creationId xmlns:a16="http://schemas.microsoft.com/office/drawing/2014/main" xmlns="" id="{4432A1B1-8BA2-4590-B91C-E46E40D4DFB4}"/>
               </a:ext>
             </a:extLst>
           </p:cNvPr>
@@ -11405,7 +11402,7 @@
           <p:cNvPr id="3" name="Content Placeholder 2">
             <a:extLst>
               <a:ext uri="{FF2B5EF4-FFF2-40B4-BE49-F238E27FC236}">
-                <a16:creationId xmlns:a16="http://schemas.microsoft.com/office/drawing/2014/main" id="{F3D5A96F-89B9-47B5-9E10-345EF073461D}"/>
+                <a16:creationId xmlns:a16="http://schemas.microsoft.com/office/drawing/2014/main" xmlns="" id="{F3D5A96F-89B9-47B5-9E10-345EF073461D}"/>
               </a:ext>
             </a:extLst>
           </p:cNvPr>
@@ -11446,7 +11443,7 @@
           <p:cNvPr id="4" name="Slide Number Placeholder 3">
             <a:extLst>
               <a:ext uri="{FF2B5EF4-FFF2-40B4-BE49-F238E27FC236}">
-                <a16:creationId xmlns:a16="http://schemas.microsoft.com/office/drawing/2014/main" id="{45FEC1D0-C942-4DB7-ACBF-32ADFCD8FDBD}"/>
+                <a16:creationId xmlns:a16="http://schemas.microsoft.com/office/drawing/2014/main" xmlns="" id="{45FEC1D0-C942-4DB7-ACBF-32ADFCD8FDBD}"/>
               </a:ext>
             </a:extLst>
           </p:cNvPr>
@@ -11476,7 +11473,7 @@
           <p:cNvPr id="13" name="Picture 12">
             <a:extLst>
               <a:ext uri="{FF2B5EF4-FFF2-40B4-BE49-F238E27FC236}">
-                <a16:creationId xmlns:a16="http://schemas.microsoft.com/office/drawing/2014/main" id="{2620E75A-9BF6-469A-8AC3-BE2F31417A55}"/>
+                <a16:creationId xmlns:a16="http://schemas.microsoft.com/office/drawing/2014/main" xmlns="" id="{2620E75A-9BF6-469A-8AC3-BE2F31417A55}"/>
               </a:ext>
             </a:extLst>
           </p:cNvPr>
@@ -11536,7 +11533,7 @@
           <p:cNvPr id="2" name="Title 1">
             <a:extLst>
               <a:ext uri="{FF2B5EF4-FFF2-40B4-BE49-F238E27FC236}">
-                <a16:creationId xmlns:a16="http://schemas.microsoft.com/office/drawing/2014/main" id="{4432A1B1-8BA2-4590-B91C-E46E40D4DFB4}"/>
+                <a16:creationId xmlns:a16="http://schemas.microsoft.com/office/drawing/2014/main" xmlns="" id="{4432A1B1-8BA2-4590-B91C-E46E40D4DFB4}"/>
               </a:ext>
             </a:extLst>
           </p:cNvPr>
@@ -11577,7 +11574,7 @@
           <p:cNvPr id="3" name="Content Placeholder 2">
             <a:extLst>
               <a:ext uri="{FF2B5EF4-FFF2-40B4-BE49-F238E27FC236}">
-                <a16:creationId xmlns:a16="http://schemas.microsoft.com/office/drawing/2014/main" id="{F3D5A96F-89B9-47B5-9E10-345EF073461D}"/>
+                <a16:creationId xmlns:a16="http://schemas.microsoft.com/office/drawing/2014/main" xmlns="" id="{F3D5A96F-89B9-47B5-9E10-345EF073461D}"/>
               </a:ext>
             </a:extLst>
           </p:cNvPr>
@@ -11639,7 +11636,7 @@
           <p:cNvPr id="4" name="Slide Number Placeholder 3">
             <a:extLst>
               <a:ext uri="{FF2B5EF4-FFF2-40B4-BE49-F238E27FC236}">
-                <a16:creationId xmlns:a16="http://schemas.microsoft.com/office/drawing/2014/main" id="{45FEC1D0-C942-4DB7-ACBF-32ADFCD8FDBD}"/>
+                <a16:creationId xmlns:a16="http://schemas.microsoft.com/office/drawing/2014/main" xmlns="" id="{45FEC1D0-C942-4DB7-ACBF-32ADFCD8FDBD}"/>
               </a:ext>
             </a:extLst>
           </p:cNvPr>
@@ -11669,7 +11666,7 @@
           <p:cNvPr id="5" name="TextBox 4">
             <a:extLst>
               <a:ext uri="{FF2B5EF4-FFF2-40B4-BE49-F238E27FC236}">
-                <a16:creationId xmlns:a16="http://schemas.microsoft.com/office/drawing/2014/main" id="{26D7FC62-10E5-42F4-B961-2EBB7F5E7D34}"/>
+                <a16:creationId xmlns:a16="http://schemas.microsoft.com/office/drawing/2014/main" xmlns="" id="{26D7FC62-10E5-42F4-B961-2EBB7F5E7D34}"/>
               </a:ext>
             </a:extLst>
           </p:cNvPr>
@@ -11734,7 +11731,7 @@
           <p:cNvPr id="2" name="Title 1">
             <a:extLst>
               <a:ext uri="{FF2B5EF4-FFF2-40B4-BE49-F238E27FC236}">
-                <a16:creationId xmlns:a16="http://schemas.microsoft.com/office/drawing/2014/main" id="{FF018C34-1FE9-4F92-B085-35D3653C0977}"/>
+                <a16:creationId xmlns:a16="http://schemas.microsoft.com/office/drawing/2014/main" xmlns="" id="{FF018C34-1FE9-4F92-B085-35D3653C0977}"/>
               </a:ext>
             </a:extLst>
           </p:cNvPr>
@@ -11774,7 +11771,7 @@
           <p:cNvPr id="3" name="Content Placeholder 2">
             <a:extLst>
               <a:ext uri="{FF2B5EF4-FFF2-40B4-BE49-F238E27FC236}">
-                <a16:creationId xmlns:a16="http://schemas.microsoft.com/office/drawing/2014/main" id="{434893F9-BFC7-43CA-9B05-ACF8CED7E908}"/>
+                <a16:creationId xmlns:a16="http://schemas.microsoft.com/office/drawing/2014/main" xmlns="" id="{434893F9-BFC7-43CA-9B05-ACF8CED7E908}"/>
               </a:ext>
             </a:extLst>
           </p:cNvPr>
@@ -11848,7 +11845,7 @@
           <p:cNvPr id="4" name="Slide Number Placeholder 3">
             <a:extLst>
               <a:ext uri="{FF2B5EF4-FFF2-40B4-BE49-F238E27FC236}">
-                <a16:creationId xmlns:a16="http://schemas.microsoft.com/office/drawing/2014/main" id="{E6187519-ED94-46FC-8DB1-93372EB33815}"/>
+                <a16:creationId xmlns:a16="http://schemas.microsoft.com/office/drawing/2014/main" xmlns="" id="{E6187519-ED94-46FC-8DB1-93372EB33815}"/>
               </a:ext>
             </a:extLst>
           </p:cNvPr>
@@ -11908,7 +11905,7 @@
           <p:cNvPr id="2" name="Title 1">
             <a:extLst>
               <a:ext uri="{FF2B5EF4-FFF2-40B4-BE49-F238E27FC236}">
-                <a16:creationId xmlns:a16="http://schemas.microsoft.com/office/drawing/2014/main" id="{FB16BEC8-C1A5-4EF6-A184-2D74367822AF}"/>
+                <a16:creationId xmlns:a16="http://schemas.microsoft.com/office/drawing/2014/main" xmlns="" id="{FB16BEC8-C1A5-4EF6-A184-2D74367822AF}"/>
               </a:ext>
             </a:extLst>
           </p:cNvPr>
@@ -11944,7 +11941,7 @@
           <p:cNvPr id="3" name="Content Placeholder 2">
             <a:extLst>
               <a:ext uri="{FF2B5EF4-FFF2-40B4-BE49-F238E27FC236}">
-                <a16:creationId xmlns:a16="http://schemas.microsoft.com/office/drawing/2014/main" id="{BCAF866A-7ABE-41F4-859C-2017718C416D}"/>
+                <a16:creationId xmlns:a16="http://schemas.microsoft.com/office/drawing/2014/main" xmlns="" id="{BCAF866A-7ABE-41F4-859C-2017718C416D}"/>
               </a:ext>
             </a:extLst>
           </p:cNvPr>
@@ -11969,7 +11966,7 @@
           <p:cNvPr id="4" name="Slide Number Placeholder 3">
             <a:extLst>
               <a:ext uri="{FF2B5EF4-FFF2-40B4-BE49-F238E27FC236}">
-                <a16:creationId xmlns:a16="http://schemas.microsoft.com/office/drawing/2014/main" id="{99B3DEC1-3D60-4A5C-A957-5343714D1414}"/>
+                <a16:creationId xmlns:a16="http://schemas.microsoft.com/office/drawing/2014/main" xmlns="" id="{99B3DEC1-3D60-4A5C-A957-5343714D1414}"/>
               </a:ext>
             </a:extLst>
           </p:cNvPr>
@@ -11999,7 +11996,7 @@
           <p:cNvPr id="6" name="Picture 5">
             <a:extLst>
               <a:ext uri="{FF2B5EF4-FFF2-40B4-BE49-F238E27FC236}">
-                <a16:creationId xmlns:a16="http://schemas.microsoft.com/office/drawing/2014/main" id="{8FCC5BCE-7985-420F-A79D-D934A89EEBE9}"/>
+                <a16:creationId xmlns:a16="http://schemas.microsoft.com/office/drawing/2014/main" xmlns="" id="{8FCC5BCE-7985-420F-A79D-D934A89EEBE9}"/>
               </a:ext>
             </a:extLst>
           </p:cNvPr>
@@ -12029,7 +12026,7 @@
           <p:cNvPr id="7" name="TextBox 6">
             <a:extLst>
               <a:ext uri="{FF2B5EF4-FFF2-40B4-BE49-F238E27FC236}">
-                <a16:creationId xmlns:a16="http://schemas.microsoft.com/office/drawing/2014/main" id="{361AF6FE-A584-42C9-9118-BF5B48CC4ECB}"/>
+                <a16:creationId xmlns:a16="http://schemas.microsoft.com/office/drawing/2014/main" xmlns="" id="{361AF6FE-A584-42C9-9118-BF5B48CC4ECB}"/>
               </a:ext>
             </a:extLst>
           </p:cNvPr>
@@ -12065,7 +12062,7 @@
           <p:cNvPr id="8" name="TextBox 7">
             <a:extLst>
               <a:ext uri="{FF2B5EF4-FFF2-40B4-BE49-F238E27FC236}">
-                <a16:creationId xmlns:a16="http://schemas.microsoft.com/office/drawing/2014/main" id="{D790A604-E066-46D9-BB3E-CC0ED37AEBDF}"/>
+                <a16:creationId xmlns:a16="http://schemas.microsoft.com/office/drawing/2014/main" xmlns="" id="{D790A604-E066-46D9-BB3E-CC0ED37AEBDF}"/>
               </a:ext>
             </a:extLst>
           </p:cNvPr>
@@ -12102,7 +12099,7 @@
           <p:cNvPr id="12" name="Group 11">
             <a:extLst>
               <a:ext uri="{FF2B5EF4-FFF2-40B4-BE49-F238E27FC236}">
-                <a16:creationId xmlns:a16="http://schemas.microsoft.com/office/drawing/2014/main" id="{17136825-CAC3-4B1E-B238-891BC5092838}"/>
+                <a16:creationId xmlns:a16="http://schemas.microsoft.com/office/drawing/2014/main" xmlns="" id="{17136825-CAC3-4B1E-B238-891BC5092838}"/>
               </a:ext>
             </a:extLst>
           </p:cNvPr>
@@ -12122,7 +12119,7 @@
             <p:cNvPr id="9" name="TextBox 8">
               <a:extLst>
                 <a:ext uri="{FF2B5EF4-FFF2-40B4-BE49-F238E27FC236}">
-                  <a16:creationId xmlns:a16="http://schemas.microsoft.com/office/drawing/2014/main" id="{8D63D24B-5D5B-435A-841E-9033D7A6C1B7}"/>
+                  <a16:creationId xmlns:a16="http://schemas.microsoft.com/office/drawing/2014/main" xmlns="" id="{8D63D24B-5D5B-435A-841E-9033D7A6C1B7}"/>
                 </a:ext>
               </a:extLst>
             </p:cNvPr>
@@ -12163,7 +12160,7 @@
             <p:cNvPr id="10" name="TextBox 9">
               <a:extLst>
                 <a:ext uri="{FF2B5EF4-FFF2-40B4-BE49-F238E27FC236}">
-                  <a16:creationId xmlns:a16="http://schemas.microsoft.com/office/drawing/2014/main" id="{E5C220FB-CF6C-46EC-9503-BF92D871293C}"/>
+                  <a16:creationId xmlns:a16="http://schemas.microsoft.com/office/drawing/2014/main" xmlns="" id="{E5C220FB-CF6C-46EC-9503-BF92D871293C}"/>
                 </a:ext>
               </a:extLst>
             </p:cNvPr>
@@ -12204,7 +12201,7 @@
             <p:cNvPr id="11" name="TextBox 10">
               <a:extLst>
                 <a:ext uri="{FF2B5EF4-FFF2-40B4-BE49-F238E27FC236}">
-                  <a16:creationId xmlns:a16="http://schemas.microsoft.com/office/drawing/2014/main" id="{E332AC51-E3E8-464E-B5B6-7430152654D5}"/>
+                  <a16:creationId xmlns:a16="http://schemas.microsoft.com/office/drawing/2014/main" xmlns="" id="{E332AC51-E3E8-464E-B5B6-7430152654D5}"/>
                 </a:ext>
               </a:extLst>
             </p:cNvPr>
@@ -12351,7 +12348,7 @@
           <p:cNvPr id="2" name="Title 1">
             <a:extLst>
               <a:ext uri="{FF2B5EF4-FFF2-40B4-BE49-F238E27FC236}">
-                <a16:creationId xmlns:a16="http://schemas.microsoft.com/office/drawing/2014/main" id="{08DC382D-5ABA-4653-970A-22D6ED1928B2}"/>
+                <a16:creationId xmlns:a16="http://schemas.microsoft.com/office/drawing/2014/main" xmlns="" id="{08DC382D-5ABA-4653-970A-22D6ED1928B2}"/>
               </a:ext>
             </a:extLst>
           </p:cNvPr>
@@ -12380,7 +12377,7 @@
           <p:cNvPr id="3" name="Content Placeholder 2">
             <a:extLst>
               <a:ext uri="{FF2B5EF4-FFF2-40B4-BE49-F238E27FC236}">
-                <a16:creationId xmlns:a16="http://schemas.microsoft.com/office/drawing/2014/main" id="{4D6CA7D1-62E3-44AF-865E-EA95086B08C9}"/>
+                <a16:creationId xmlns:a16="http://schemas.microsoft.com/office/drawing/2014/main" xmlns="" id="{4D6CA7D1-62E3-44AF-865E-EA95086B08C9}"/>
               </a:ext>
             </a:extLst>
           </p:cNvPr>
@@ -12466,7 +12463,7 @@
           <p:cNvPr id="4" name="Slide Number Placeholder 3">
             <a:extLst>
               <a:ext uri="{FF2B5EF4-FFF2-40B4-BE49-F238E27FC236}">
-                <a16:creationId xmlns:a16="http://schemas.microsoft.com/office/drawing/2014/main" id="{B856BA49-3F84-44AF-B014-BFE402F2115B}"/>
+                <a16:creationId xmlns:a16="http://schemas.microsoft.com/office/drawing/2014/main" xmlns="" id="{B856BA49-3F84-44AF-B014-BFE402F2115B}"/>
               </a:ext>
             </a:extLst>
           </p:cNvPr>
@@ -12496,7 +12493,7 @@
           <p:cNvPr id="5" name="TextBox 4">
             <a:extLst>
               <a:ext uri="{FF2B5EF4-FFF2-40B4-BE49-F238E27FC236}">
-                <a16:creationId xmlns:a16="http://schemas.microsoft.com/office/drawing/2014/main" id="{BC9E4CC0-8370-45DD-B89A-0697AB7AF78D}"/>
+                <a16:creationId xmlns:a16="http://schemas.microsoft.com/office/drawing/2014/main" xmlns="" id="{BC9E4CC0-8370-45DD-B89A-0697AB7AF78D}"/>
               </a:ext>
             </a:extLst>
           </p:cNvPr>
@@ -12561,7 +12558,7 @@
           <p:cNvPr id="2" name="Title 1">
             <a:extLst>
               <a:ext uri="{FF2B5EF4-FFF2-40B4-BE49-F238E27FC236}">
-                <a16:creationId xmlns:a16="http://schemas.microsoft.com/office/drawing/2014/main" id="{BB90F14D-5220-4A62-A7F3-F87698065F0F}"/>
+                <a16:creationId xmlns:a16="http://schemas.microsoft.com/office/drawing/2014/main" xmlns="" id="{BB90F14D-5220-4A62-A7F3-F87698065F0F}"/>
               </a:ext>
             </a:extLst>
           </p:cNvPr>
@@ -12602,7 +12599,7 @@
           <p:cNvPr id="3" name="Content Placeholder 2">
             <a:extLst>
               <a:ext uri="{FF2B5EF4-FFF2-40B4-BE49-F238E27FC236}">
-                <a16:creationId xmlns:a16="http://schemas.microsoft.com/office/drawing/2014/main" id="{CA6E65FC-E3CC-46B1-81FE-E383DBE52F38}"/>
+                <a16:creationId xmlns:a16="http://schemas.microsoft.com/office/drawing/2014/main" xmlns="" id="{CA6E65FC-E3CC-46B1-81FE-E383DBE52F38}"/>
               </a:ext>
             </a:extLst>
           </p:cNvPr>
@@ -12653,11 +12650,7 @@
           <a:p>
             <a:r>
               <a:rPr lang="es-CL" dirty="0" smtClean="0"/>
-              <a:t>En este curso </a:t>
-            </a:r>
-            <a:r>
-              <a:rPr lang="es-CL" dirty="0" smtClean="0"/>
-              <a:t>usaremos: </a:t>
+              <a:t>En este curso usaremos: </a:t>
             </a:r>
             <a:r>
               <a:rPr lang="es-CL" dirty="0" err="1" smtClean="0"/>
@@ -12685,7 +12678,7 @@
           <p:cNvPr id="4" name="Slide Number Placeholder 3">
             <a:extLst>
               <a:ext uri="{FF2B5EF4-FFF2-40B4-BE49-F238E27FC236}">
-                <a16:creationId xmlns:a16="http://schemas.microsoft.com/office/drawing/2014/main" id="{F93221D8-CCBC-41F1-B49A-9F93987F2405}"/>
+                <a16:creationId xmlns:a16="http://schemas.microsoft.com/office/drawing/2014/main" xmlns="" id="{F93221D8-CCBC-41F1-B49A-9F93987F2405}"/>
               </a:ext>
             </a:extLst>
           </p:cNvPr>

</xml_diff>